<commit_message>
[LEI] NOTAS DO KIKO NO PPT, PLS DONT DELETE THEM
se apagarem as notas eu nao apresento PONTO XD
</commit_message>
<xml_diff>
--- a/LEI/apresentações/checkpoint2/apresLEI_grupo47.pptx
+++ b/LEI/apresentações/checkpoint2/apresLEI_grupo47.pptx
@@ -555,7 +555,7 @@
           <a:p>
             <a:r>
               <a:rPr lang="pt-PT" dirty="0"/>
-              <a:t>Eu sou o Francisco, este é o Raul, e esta é a Diana e vamos começar a nossa apresentação do </a:t>
+              <a:t>Eu sou o Francisco, Raul, Diana e vamos começar a nossa segunda apresentação do </a:t>
             </a:r>
             <a:r>
               <a:rPr lang="pt-PT" u="sng" dirty="0"/>
@@ -581,8 +581,25 @@
             </a:r>
             <a:r>
               <a:rPr lang="pt-PT" b="1" u="sng" dirty="0"/>
-              <a:t>”</a:t>
-            </a:r>
+              <a:t>”,</a:t>
+            </a:r>
+            <a:r>
+              <a:rPr lang="pt-PT" b="0" u="none" dirty="0"/>
+              <a:t> </a:t>
+            </a:r>
+            <a:r>
+              <a:rPr lang="pt-PT" b="0" u="sng" dirty="0"/>
+              <a:t>orientado </a:t>
+            </a:r>
+            <a:r>
+              <a:rPr lang="pt-PT" b="0" u="none" dirty="0"/>
+              <a:t>pelos professores </a:t>
+            </a:r>
+            <a:r>
+              <a:rPr lang="pt-PT" b="0" u="sng" dirty="0"/>
+              <a:t>José João e Pedro Henriques</a:t>
+            </a:r>
+            <a:endParaRPr lang="pt-PT" b="1" u="sng" dirty="0"/>
           </a:p>
         </p:txBody>
       </p:sp>
@@ -1520,6 +1537,65 @@
               <a:t>KIKO</a:t>
             </a:r>
           </a:p>
+          <a:p>
+            <a:pPr algn="l"/>
+            <a:r>
+              <a:rPr lang="pt-PT" dirty="0"/>
+              <a:t>Portanto nesta segunda apresentação, relembro que o nosso </a:t>
+            </a:r>
+            <a:r>
+              <a:rPr lang="pt-PT" b="1" dirty="0"/>
+              <a:t>objetivo</a:t>
+            </a:r>
+            <a:r>
+              <a:rPr lang="pt-PT" b="0" dirty="0"/>
+              <a:t> é:</a:t>
+            </a:r>
+          </a:p>
+          <a:p>
+            <a:pPr algn="l"/>
+            <a:r>
+              <a:rPr lang="pt-PT" b="0" dirty="0"/>
+              <a:t>-criação de uma </a:t>
+            </a:r>
+            <a:r>
+              <a:rPr lang="pt-PT" b="1" u="none" dirty="0"/>
+              <a:t>DSL </a:t>
+            </a:r>
+            <a:r>
+              <a:rPr lang="pt-PT" b="0" u="none" dirty="0"/>
+              <a:t>para a </a:t>
+            </a:r>
+            <a:r>
+              <a:rPr lang="pt-PT" b="1" u="none" dirty="0"/>
+              <a:t>geração automática de </a:t>
+            </a:r>
+            <a:r>
+              <a:rPr lang="pt-PT" b="1" u="none" dirty="0" err="1"/>
+              <a:t>bots</a:t>
+            </a:r>
+            <a:endParaRPr lang="pt-PT" b="1" u="none" dirty="0"/>
+          </a:p>
+          <a:p>
+            <a:pPr algn="l"/>
+            <a:r>
+              <a:rPr lang="pt-PT" b="0" u="none" dirty="0"/>
+              <a:t>-&gt; juntamos a especificação (DSL) e fontes de informação (</a:t>
+            </a:r>
+            <a:r>
+              <a:rPr lang="pt-PT" b="0" u="none" dirty="0" err="1"/>
+              <a:t>datasets</a:t>
+            </a:r>
+            <a:r>
+              <a:rPr lang="pt-PT" b="0" u="none" dirty="0"/>
+              <a:t>) para gerar os </a:t>
+            </a:r>
+            <a:r>
+              <a:rPr lang="pt-PT" b="0" u="none" dirty="0" err="1"/>
+              <a:t>bots</a:t>
+            </a:r>
+            <a:endParaRPr lang="pt-PT" b="0" u="none" dirty="0"/>
+          </a:p>
         </p:txBody>
       </p:sp>
       <p:sp>
@@ -1956,6 +2032,141 @@
               <a:t>KIKO</a:t>
             </a:r>
           </a:p>
+          <a:p>
+            <a:r>
+              <a:rPr lang="pt-PT" dirty="0"/>
+              <a:t>Aqui temos uma amostra da nossa </a:t>
+            </a:r>
+            <a:r>
+              <a:rPr lang="pt-PT" b="1" dirty="0"/>
+              <a:t>DSL.</a:t>
+            </a:r>
+          </a:p>
+          <a:p>
+            <a:r>
+              <a:rPr lang="pt-PT" b="0" dirty="0"/>
+              <a:t>DSL esta dividida em 3partes: </a:t>
+            </a:r>
+            <a:r>
+              <a:rPr lang="pt-PT" b="1" i="0" u="sng" dirty="0"/>
+              <a:t>CREATE, STATES, JOIN</a:t>
+            </a:r>
+          </a:p>
+          <a:p>
+            <a:r>
+              <a:rPr lang="pt-PT" b="0" i="0" u="none" dirty="0"/>
+              <a:t>-</a:t>
+            </a:r>
+            <a:r>
+              <a:rPr lang="pt-PT" b="0" i="0" u="sng" dirty="0"/>
+              <a:t>CREATE</a:t>
+            </a:r>
+            <a:r>
+              <a:rPr lang="pt-PT" b="0" i="0" u="none" dirty="0"/>
+              <a:t> permite definir </a:t>
+            </a:r>
+            <a:r>
+              <a:rPr lang="pt-PT" b="1" i="0" u="none" dirty="0" err="1"/>
+              <a:t>bots</a:t>
+            </a:r>
+            <a:r>
+              <a:rPr lang="pt-PT" b="1" i="0" u="none" dirty="0"/>
+              <a:t> individuais</a:t>
+            </a:r>
+            <a:r>
+              <a:rPr lang="pt-PT" b="0" i="0" u="none" dirty="0"/>
+              <a:t>. CREATE &lt;</a:t>
+            </a:r>
+            <a:r>
+              <a:rPr lang="pt-PT" b="0" i="0" u="none" dirty="0" err="1"/>
+              <a:t>bot_nosso</a:t>
+            </a:r>
+            <a:r>
+              <a:rPr lang="pt-PT" b="0" i="0" u="none" dirty="0"/>
+              <a:t>&gt; FROM &lt;dataset.info&gt; WITH &lt;</a:t>
+            </a:r>
+            <a:r>
+              <a:rPr lang="pt-PT" b="0" i="0" u="none" dirty="0" err="1"/>
+              <a:t>schema.json</a:t>
+            </a:r>
+            <a:r>
+              <a:rPr lang="pt-PT" b="0" i="0" u="none" dirty="0"/>
+              <a:t>&gt;</a:t>
+            </a:r>
+          </a:p>
+          <a:p>
+            <a:r>
+              <a:rPr lang="pt-PT" b="0" i="0" u="none" dirty="0"/>
+              <a:t>-</a:t>
+            </a:r>
+            <a:r>
+              <a:rPr lang="pt-PT" b="0" i="0" u="sng" dirty="0"/>
+              <a:t>STATES</a:t>
+            </a:r>
+            <a:r>
+              <a:rPr lang="pt-PT" b="0" i="0" u="none" dirty="0"/>
+              <a:t> é onde definimos os </a:t>
+            </a:r>
+            <a:r>
+              <a:rPr lang="pt-PT" b="1" i="0" u="none" dirty="0"/>
+              <a:t>estados do </a:t>
+            </a:r>
+            <a:r>
+              <a:rPr lang="pt-PT" b="1" i="0" u="none" dirty="0" err="1"/>
+              <a:t>bot</a:t>
+            </a:r>
+            <a:r>
+              <a:rPr lang="pt-PT" b="0" i="0" u="none" dirty="0"/>
+              <a:t>, que servem para alterar um pouco as reações do </a:t>
+            </a:r>
+            <a:r>
+              <a:rPr lang="pt-PT" b="0" i="0" u="none" dirty="0" err="1"/>
+              <a:t>bot</a:t>
+            </a:r>
+            <a:r>
+              <a:rPr lang="pt-PT" b="0" i="0" u="none" dirty="0"/>
+              <a:t>, em tempo real de dialogo.</a:t>
+            </a:r>
+          </a:p>
+          <a:p>
+            <a:r>
+              <a:rPr lang="pt-PT" b="0" i="0" u="none" dirty="0"/>
+              <a:t>-</a:t>
+            </a:r>
+            <a:r>
+              <a:rPr lang="pt-PT" b="0" i="0" u="sng" dirty="0"/>
+              <a:t>JOIN</a:t>
+            </a:r>
+            <a:r>
+              <a:rPr lang="pt-PT" b="0" i="0" u="none" dirty="0"/>
+              <a:t> é onde </a:t>
+            </a:r>
+            <a:r>
+              <a:rPr lang="pt-PT" b="1" i="0" u="none" dirty="0"/>
+              <a:t>definimos os </a:t>
+            </a:r>
+            <a:r>
+              <a:rPr lang="pt-PT" b="1" i="0" u="none" dirty="0" err="1"/>
+              <a:t>bots</a:t>
+            </a:r>
+            <a:r>
+              <a:rPr lang="pt-PT" b="1" i="0" u="none" dirty="0"/>
+              <a:t> </a:t>
+            </a:r>
+            <a:r>
+              <a:rPr lang="pt-PT" b="0" i="0" u="none" dirty="0"/>
+              <a:t>a usar e a sua </a:t>
+            </a:r>
+            <a:r>
+              <a:rPr lang="pt-PT" b="1" i="0" u="none" dirty="0"/>
+              <a:t>prioridade</a:t>
+            </a:r>
+            <a:r>
+              <a:rPr lang="pt-PT" b="0" i="0" u="none" dirty="0"/>
+              <a:t>.</a:t>
+            </a:r>
+            <a:endParaRPr lang="pt-PT" b="0" i="0" u="sng" dirty="0"/>
+          </a:p>
         </p:txBody>
       </p:sp>
       <p:sp>
@@ -2040,7 +2251,65 @@
           <a:p>
             <a:r>
               <a:rPr lang="pt-PT" dirty="0"/>
-              <a:t>RAUL</a:t>
+              <a:t>KIKO</a:t>
+            </a:r>
+          </a:p>
+          <a:p>
+            <a:r>
+              <a:rPr lang="pt-PT" dirty="0"/>
+              <a:t>Portanto aqui temos um </a:t>
+            </a:r>
+            <a:r>
+              <a:rPr lang="pt-PT" b="1" dirty="0"/>
+              <a:t>excerto de uma conversa</a:t>
+            </a:r>
+            <a:r>
+              <a:rPr lang="pt-PT" b="0" dirty="0"/>
+              <a:t> entre o nosso </a:t>
+            </a:r>
+            <a:r>
+              <a:rPr lang="pt-PT" b="0" dirty="0" err="1"/>
+              <a:t>bot</a:t>
+            </a:r>
+            <a:r>
+              <a:rPr lang="pt-PT" b="0" dirty="0"/>
+              <a:t> e um utilizador, num </a:t>
+            </a:r>
+            <a:r>
+              <a:rPr lang="pt-PT" b="1" i="0" u="sng" dirty="0"/>
+              <a:t>contexto da SEI</a:t>
+            </a:r>
+          </a:p>
+          <a:p>
+            <a:r>
+              <a:rPr lang="pt-PT" b="0" i="0" dirty="0"/>
+              <a:t>-Saudação</a:t>
+            </a:r>
+          </a:p>
+          <a:p>
+            <a:r>
+              <a:rPr lang="pt-PT" b="0" i="0" dirty="0"/>
+              <a:t>-Quando + começa SEI -&gt; segundo semestre </a:t>
+            </a:r>
+            <a:r>
+              <a:rPr lang="pt-PT" b="1" i="0" dirty="0"/>
+              <a:t>[FAQ]</a:t>
+            </a:r>
+          </a:p>
+          <a:p>
+            <a:r>
+              <a:rPr lang="pt-PT" b="0" i="0" dirty="0"/>
+              <a:t>-Onde + SEI -&gt; Campus de Gualtar </a:t>
+            </a:r>
+            <a:r>
+              <a:rPr lang="pt-PT" b="1" i="0" dirty="0"/>
+              <a:t>[FAQ]</a:t>
+            </a:r>
+          </a:p>
+          <a:p>
+            <a:r>
+              <a:rPr lang="pt-PT" b="0" i="0" dirty="0"/>
+              <a:t>-Quando + sessão de abertura -&gt; RAUL GO</a:t>
             </a:r>
           </a:p>
         </p:txBody>
@@ -23015,7 +23284,7 @@
                 <a:latin typeface="Consolas" panose="020B0609020204030204" pitchFamily="49" charset="0"/>
                 <a:cs typeface="Segoe UI" panose="020B0502040204020203" pitchFamily="34" charset="0"/>
               </a:rPr>
-              <a:t>: A SEI é gratuita, n tens que </a:t>
+              <a:t>: A SEI é gratuita, não tens que </a:t>
             </a:r>
             <a:r>
               <a:rPr lang="pt-PT" dirty="0">

</xml_diff>